<commit_message>
Release candidate of my presentation.
</commit_message>
<xml_diff>
--- a/diploma/trunk/ppt/starovoitov.pptx
+++ b/diploma/trunk/ppt/starovoitov.pptx
@@ -9906,7 +9906,7 @@
         </p:blipFill>
         <p:spPr bwMode="auto">
           <a:xfrm>
-            <a:off x="1506538" y="1166813"/>
+            <a:off x="1506538" y="1096150"/>
             <a:ext cx="7296150" cy="5883275"/>
           </a:xfrm>
           <a:prstGeom prst="rect">
@@ -10934,7 +10934,7 @@
         </p:nvSpPr>
         <p:spPr bwMode="auto">
           <a:xfrm>
-            <a:off x="0" y="780240"/>
+            <a:off x="0" y="596084"/>
             <a:ext cx="10158413" cy="673100"/>
           </a:xfrm>
           <a:prstGeom prst="rect">
@@ -10991,8 +10991,29 @@
                   <a:srgbClr val="04617B"/>
                 </a:solidFill>
               </a:rPr>
-              <a:t>Использование API</a:t>
-            </a:r>
+              <a:t>Использование </a:t>
+            </a:r>
+            <a:r>
+              <a:rPr lang="en-US" sz="4000" dirty="0" smtClean="0">
+                <a:solidFill>
+                  <a:srgbClr val="04617B"/>
+                </a:solidFill>
+              </a:rPr>
+              <a:t>API</a:t>
+            </a:r>
+            <a:r>
+              <a:rPr lang="ru-RU" sz="4000" dirty="0" smtClean="0">
+                <a:solidFill>
+                  <a:srgbClr val="04617B"/>
+                </a:solidFill>
+              </a:rPr>
+              <a:t> модулей</a:t>
+            </a:r>
+            <a:endParaRPr lang="en-US" sz="4000" dirty="0">
+              <a:solidFill>
+                <a:srgbClr val="04617B"/>
+              </a:solidFill>
+            </a:endParaRPr>
           </a:p>
         </p:txBody>
       </p:sp>
@@ -11950,8 +11971,8 @@
         </p:blipFill>
         <p:spPr>
           <a:xfrm>
-            <a:off x="364298" y="1739092"/>
-            <a:ext cx="9431067" cy="4839376"/>
+            <a:off x="139220" y="1667654"/>
+            <a:ext cx="9797770" cy="5027543"/>
           </a:xfrm>
           <a:prstGeom prst="rect">
             <a:avLst/>
@@ -19076,6 +19097,160 @@
           </a:prstGeom>
         </p:spPr>
       </p:pic>
+      <p:cxnSp>
+        <p:nvCxnSpPr>
+          <p:cNvPr id="19" name="Прямая со стрелкой 18"/>
+          <p:cNvCxnSpPr/>
+          <p:nvPr/>
+        </p:nvCxnSpPr>
+        <p:spPr bwMode="auto">
+          <a:xfrm rot="5400000">
+            <a:off x="542099" y="3703637"/>
+            <a:ext cx="500860" cy="794"/>
+          </a:xfrm>
+          <a:prstGeom prst="straightConnector1">
+            <a:avLst/>
+          </a:prstGeom>
+          <a:solidFill>
+            <a:srgbClr val="00B8FF"/>
+          </a:solidFill>
+          <a:ln w="9525" cap="flat" cmpd="sng" algn="ctr">
+            <a:solidFill>
+              <a:schemeClr val="tx1"/>
+            </a:solidFill>
+            <a:prstDash val="solid"/>
+            <a:round/>
+            <a:headEnd type="none" w="med" len="med"/>
+            <a:tailEnd type="arrow"/>
+          </a:ln>
+          <a:effectLst/>
+        </p:spPr>
+      </p:cxnSp>
+      <p:sp>
+        <p:nvSpPr>
+          <p:cNvPr id="22" name="TextBox 21"/>
+          <p:cNvSpPr txBox="1"/>
+          <p:nvPr/>
+        </p:nvSpPr>
+        <p:spPr>
+          <a:xfrm>
+            <a:off x="149984" y="2882100"/>
+            <a:ext cx="1500198" cy="607602"/>
+          </a:xfrm>
+          <a:prstGeom prst="rect">
+            <a:avLst/>
+          </a:prstGeom>
+          <a:noFill/>
+        </p:spPr>
+        <p:txBody>
+          <a:bodyPr wrap="square" rtlCol="0">
+            <a:spAutoFit/>
+          </a:bodyPr>
+          <a:lstStyle/>
+          <a:p>
+            <a:r>
+              <a:rPr lang="ru-RU" dirty="0" smtClean="0">
+                <a:solidFill>
+                  <a:schemeClr val="tx1"/>
+                </a:solidFill>
+              </a:rPr>
+              <a:t>Панель</a:t>
+            </a:r>
+          </a:p>
+          <a:p>
+            <a:r>
+              <a:rPr lang="ru-RU" dirty="0" smtClean="0">
+                <a:solidFill>
+                  <a:schemeClr val="tx1"/>
+                </a:solidFill>
+              </a:rPr>
+              <a:t>управления</a:t>
+            </a:r>
+            <a:endParaRPr lang="ru-RU" dirty="0">
+              <a:solidFill>
+                <a:schemeClr val="tx1"/>
+              </a:solidFill>
+            </a:endParaRPr>
+          </a:p>
+        </p:txBody>
+      </p:sp>
+      <p:cxnSp>
+        <p:nvCxnSpPr>
+          <p:cNvPr id="23" name="Прямая со стрелкой 22"/>
+          <p:cNvCxnSpPr/>
+          <p:nvPr/>
+        </p:nvCxnSpPr>
+        <p:spPr bwMode="auto">
+          <a:xfrm rot="16200000" flipV="1">
+            <a:off x="7400941" y="5846777"/>
+            <a:ext cx="285752" cy="71438"/>
+          </a:xfrm>
+          <a:prstGeom prst="straightConnector1">
+            <a:avLst/>
+          </a:prstGeom>
+          <a:solidFill>
+            <a:srgbClr val="00B8FF"/>
+          </a:solidFill>
+          <a:ln w="9525" cap="flat" cmpd="sng" algn="ctr">
+            <a:solidFill>
+              <a:schemeClr val="tx1"/>
+            </a:solidFill>
+            <a:prstDash val="solid"/>
+            <a:round/>
+            <a:headEnd type="none" w="med" len="med"/>
+            <a:tailEnd type="arrow"/>
+          </a:ln>
+          <a:effectLst/>
+        </p:spPr>
+      </p:cxnSp>
+      <p:sp>
+        <p:nvSpPr>
+          <p:cNvPr id="27" name="TextBox 26"/>
+          <p:cNvSpPr txBox="1"/>
+          <p:nvPr/>
+        </p:nvSpPr>
+        <p:spPr>
+          <a:xfrm>
+            <a:off x="6793718" y="6096810"/>
+            <a:ext cx="2735044" cy="607602"/>
+          </a:xfrm>
+          <a:prstGeom prst="rect">
+            <a:avLst/>
+          </a:prstGeom>
+          <a:noFill/>
+        </p:spPr>
+        <p:txBody>
+          <a:bodyPr wrap="none" rtlCol="0">
+            <a:spAutoFit/>
+          </a:bodyPr>
+          <a:lstStyle/>
+          <a:p>
+            <a:r>
+              <a:rPr lang="ru-RU" dirty="0" smtClean="0">
+                <a:solidFill>
+                  <a:schemeClr val="tx1"/>
+                </a:solidFill>
+              </a:rPr>
+              <a:t>Прикладной интерфейс</a:t>
+            </a:r>
+          </a:p>
+          <a:p>
+            <a:r>
+              <a:rPr lang="ru-RU" dirty="0" smtClean="0">
+                <a:solidFill>
+                  <a:schemeClr val="tx1"/>
+                </a:solidFill>
+              </a:rPr>
+              <a:t>программирования</a:t>
+            </a:r>
+            <a:endParaRPr lang="ru-RU" dirty="0">
+              <a:solidFill>
+                <a:schemeClr val="tx1"/>
+              </a:solidFill>
+            </a:endParaRPr>
+          </a:p>
+        </p:txBody>
+      </p:sp>
     </p:spTree>
   </p:cSld>
   <p:clrMapOvr>
@@ -21318,7 +21493,7 @@
       </p:sp>
       <p:pic>
         <p:nvPicPr>
-          <p:cNvPr id="19" name="Рисунок 18" descr="UML_discover.png"/>
+          <p:cNvPr id="18" name="Рисунок 17" descr="UML_discover.png"/>
           <p:cNvPicPr>
             <a:picLocks noChangeAspect="1"/>
           </p:cNvPicPr>
@@ -21332,8 +21507,8 @@
         </p:blipFill>
         <p:spPr>
           <a:xfrm>
-            <a:off x="1661774" y="1381902"/>
-            <a:ext cx="7060770" cy="5653553"/>
+            <a:off x="1435868" y="1275567"/>
+            <a:ext cx="7560837" cy="5749937"/>
           </a:xfrm>
           <a:prstGeom prst="rect">
             <a:avLst/>
@@ -21946,38 +22121,6 @@
           </a:p>
         </p:txBody>
       </p:sp>
-      <p:pic>
-        <p:nvPicPr>
-          <p:cNvPr id="8202" name="Picture 9"/>
-          <p:cNvPicPr>
-            <a:picLocks noChangeAspect="1" noChangeArrowheads="1"/>
-          </p:cNvPicPr>
-          <p:nvPr/>
-        </p:nvPicPr>
-        <p:blipFill>
-          <a:blip r:embed="rId4"/>
-          <a:srcRect/>
-          <a:stretch>
-            <a:fillRect/>
-          </a:stretch>
-        </p:blipFill>
-        <p:spPr bwMode="auto">
-          <a:xfrm>
-            <a:off x="935038" y="952500"/>
-            <a:ext cx="8070850" cy="6073775"/>
-          </a:xfrm>
-          <a:prstGeom prst="rect">
-            <a:avLst/>
-          </a:prstGeom>
-          <a:noFill/>
-          <a:ln w="9525">
-            <a:noFill/>
-            <a:round/>
-            <a:headEnd/>
-            <a:tailEnd/>
-          </a:ln>
-        </p:spPr>
-      </p:pic>
       <p:sp>
         <p:nvSpPr>
           <p:cNvPr id="8203" name="Text Box 10"/>
@@ -22447,6 +22590,30 @@
           </a:p>
         </p:txBody>
       </p:sp>
+      <p:pic>
+        <p:nvPicPr>
+          <p:cNvPr id="19" name="Рисунок 18" descr="Class_Diagram.png"/>
+          <p:cNvPicPr>
+            <a:picLocks noChangeAspect="1"/>
+          </p:cNvPicPr>
+          <p:nvPr/>
+        </p:nvPicPr>
+        <p:blipFill>
+          <a:blip r:embed="rId4"/>
+          <a:stretch>
+            <a:fillRect/>
+          </a:stretch>
+        </p:blipFill>
+        <p:spPr>
+          <a:xfrm>
+            <a:off x="864364" y="881836"/>
+            <a:ext cx="8208862" cy="6176570"/>
+          </a:xfrm>
+          <a:prstGeom prst="rect">
+            <a:avLst/>
+          </a:prstGeom>
+        </p:spPr>
+      </p:pic>
     </p:spTree>
   </p:cSld>
   <p:clrMapOvr>
@@ -22664,38 +22831,6 @@
           </a:p>
         </p:txBody>
       </p:sp>
-      <p:pic>
-        <p:nvPicPr>
-          <p:cNvPr id="9220" name="Picture 3"/>
-          <p:cNvPicPr>
-            <a:picLocks noChangeAspect="1" noChangeArrowheads="1"/>
-          </p:cNvPicPr>
-          <p:nvPr/>
-        </p:nvPicPr>
-        <p:blipFill>
-          <a:blip r:embed="rId4"/>
-          <a:srcRect/>
-          <a:stretch>
-            <a:fillRect/>
-          </a:stretch>
-        </p:blipFill>
-        <p:spPr bwMode="auto">
-          <a:xfrm>
-            <a:off x="2293124" y="1810530"/>
-            <a:ext cx="6030913" cy="3767137"/>
-          </a:xfrm>
-          <a:prstGeom prst="rect">
-            <a:avLst/>
-          </a:prstGeom>
-          <a:noFill/>
-          <a:ln w="9525">
-            <a:noFill/>
-            <a:round/>
-            <a:headEnd/>
-            <a:tailEnd/>
-          </a:ln>
-        </p:spPr>
-      </p:pic>
       <p:sp>
         <p:nvSpPr>
           <p:cNvPr id="9221" name="Text Box 4"/>
@@ -23865,6 +24000,30 @@
           </a:p>
         </p:txBody>
       </p:sp>
+      <p:pic>
+        <p:nvPicPr>
+          <p:cNvPr id="21" name="Рисунок 20" descr="Domain.png"/>
+          <p:cNvPicPr>
+            <a:picLocks noChangeAspect="1"/>
+          </p:cNvPicPr>
+          <p:nvPr/>
+        </p:nvPicPr>
+        <p:blipFill>
+          <a:blip r:embed="rId4"/>
+          <a:stretch>
+            <a:fillRect/>
+          </a:stretch>
+        </p:blipFill>
+        <p:spPr>
+          <a:xfrm>
+            <a:off x="2150248" y="1667654"/>
+            <a:ext cx="6403530" cy="4000528"/>
+          </a:xfrm>
+          <a:prstGeom prst="rect">
+            <a:avLst/>
+          </a:prstGeom>
+        </p:spPr>
+      </p:pic>
     </p:spTree>
   </p:cSld>
   <p:clrMapOvr>

</xml_diff>